<commit_message>
Added Nengo-PRIMS presentation and paper
</commit_message>
<xml_diff>
--- a/PRIMsTutorial4.pptx
+++ b/PRIMsTutorial4.pptx
@@ -10364,12 +10364,13 @@
           <a:p>
             <a:r>
               <a:rPr lang="en-US" dirty="0"/>
-              <a:t>PRIMs learns associations, which fully depend on </a:t>
-            </a:r>
-            <a:r>
-              <a:rPr lang="en-US"/>
-              <a:t>the context</a:t>
-            </a:r>
+              <a:t>PRIMs learns associations, which fully depend on the context</a:t>
+            </a:r>
+          </a:p>
+          <a:p>
+            <a:pPr marL="0" indent="0">
+              <a:buNone/>
+            </a:pPr>
             <a:endParaRPr lang="en-US" dirty="0"/>
           </a:p>
         </p:txBody>

</xml_diff>